<commit_message>
Update AI Final Presentation Synthetic Data.pptx
</commit_message>
<xml_diff>
--- a/AI Final Presentation Synthetic Data.pptx
+++ b/AI Final Presentation Synthetic Data.pptx
@@ -6965,7 +6965,7 @@
             </a:pPr>
             <a:r>
               <a:rPr lang="en"/>
-              <a:t>April XX, 2023</a:t>
+              <a:t>April 12, 2023</a:t>
             </a:r>
             <a:br>
               <a:rPr lang="en"/>
@@ -7037,7 +7037,7 @@
             </a:pPr>
             <a:r>
               <a:rPr lang="en"/>
-              <a:t>Problem Statement: We need data!</a:t>
+              <a:t>Problem Statement: We need legal data!</a:t>
             </a:r>
             <a:endParaRPr/>
           </a:p>
@@ -7077,7 +7077,7 @@
             </a:pPr>
             <a:r>
               <a:rPr lang="en"/>
-              <a:t>We want to train an AI model to extract information from manually-scanned PDFs. We only have so many documents to train from, and they don’t represent the full range of possible smudges and corruptions. What can we do to make our model more robust?</a:t>
+              <a:t>We want to train an AI model to extract information from manually-scanned PDFs. We only have so many documents to train from, and they don’t represent the full range of possible smudges and corruptions. What can we do to make our model more robust? What can we do to shield our data-providing customers from the model’s training?</a:t>
             </a:r>
             <a:endParaRPr/>
           </a:p>
@@ -7660,7 +7660,7 @@
             </a:r>
             <a:r>
               <a:rPr lang="en"/>
-              <a:t> ethical? It’s fake, but…</a:t>
+              <a:t> ethical? It’s faked, but…</a:t>
             </a:r>
             <a:endParaRPr/>
           </a:p>
@@ -7936,8 +7936,8 @@
         </p:nvSpPr>
         <p:spPr>
           <a:xfrm>
-            <a:off x="-62675" y="4055800"/>
-            <a:ext cx="9390900" cy="154800"/>
+            <a:off x="25" y="4055800"/>
+            <a:ext cx="9144000" cy="154800"/>
           </a:xfrm>
           <a:prstGeom prst="rect">
             <a:avLst/>
@@ -8080,7 +8080,7 @@
             </a:pPr>
             <a:r>
               <a:rPr lang="en"/>
-              <a:t>April XX, 2023</a:t>
+              <a:t>April 12, 2023</a:t>
             </a:r>
             <a:br>
               <a:rPr lang="en"/>

</xml_diff>